<commit_message>
Bilan Sam et bilan collectif ppt
</commit_message>
<xml_diff>
--- a/KonnectedFinal.pptx
+++ b/KonnectedFinal.pptx
@@ -117,7 +117,16 @@
       </a:defRPr>
     </a:lvl9pPr>
   </p:defaultTextStyle>
+  <p:extLst>
+    <p:ext uri="{EFAFB233-063F-42B5-8137-9DF3F51BA10A}">
+      <p15:sldGuideLst xmlns:p15="http://schemas.microsoft.com/office/powerpoint/2012/main"/>
+    </p:ext>
+  </p:extLst>
 </p:presentation>
+</file>
+
+<file path=ppt/revisionInfo.xml><?xml version="1.0" encoding="utf-8"?>
+<p1510:revInfo xmlns:a="http://schemas.openxmlformats.org/drawingml/2006/main" xmlns:r="http://schemas.openxmlformats.org/officeDocument/2006/relationships" xmlns:p1510="http://schemas.microsoft.com/office/powerpoint/2015/10/main"/>
 </file>
 
 <file path=ppt/diagrams/colors1.xml><?xml version="1.0" encoding="utf-8"?>
@@ -934,14 +943,222 @@
         <a:lstStyle/>
         <a:p>
           <a:r>
-            <a:rPr lang="en-US">
+            <a:rPr lang="en-US" dirty="0">
               <a:solidFill>
                 <a:schemeClr val="bg1"/>
               </a:solidFill>
             </a:rPr>
-            <a:t>Ce projet de web m’a permis d’approfondir mes connaissances des technologies du web, tels que les frameworks, avec Bootstrap, la gestion utilisateurs, la sécurisation de la connexion avec le hashage de mot de passe.</a:t>
+            <a:t>Ce </a:t>
           </a:r>
-          <a:endParaRPr lang="fr-FR">
+          <a:r>
+            <a:rPr lang="en-US" dirty="0" err="1">
+              <a:solidFill>
+                <a:schemeClr val="bg1"/>
+              </a:solidFill>
+            </a:rPr>
+            <a:t>projet</a:t>
+          </a:r>
+          <a:r>
+            <a:rPr lang="en-US" dirty="0">
+              <a:solidFill>
+                <a:schemeClr val="bg1"/>
+              </a:solidFill>
+            </a:rPr>
+            <a:t> de web </a:t>
+          </a:r>
+          <a:r>
+            <a:rPr lang="en-US" dirty="0" err="1">
+              <a:solidFill>
+                <a:schemeClr val="bg1"/>
+              </a:solidFill>
+            </a:rPr>
+            <a:t>m’a</a:t>
+          </a:r>
+          <a:r>
+            <a:rPr lang="en-US" dirty="0">
+              <a:solidFill>
+                <a:schemeClr val="bg1"/>
+              </a:solidFill>
+            </a:rPr>
+            <a:t> </a:t>
+          </a:r>
+          <a:r>
+            <a:rPr lang="en-US" dirty="0" err="1">
+              <a:solidFill>
+                <a:schemeClr val="bg1"/>
+              </a:solidFill>
+            </a:rPr>
+            <a:t>permis</a:t>
+          </a:r>
+          <a:r>
+            <a:rPr lang="en-US" dirty="0">
+              <a:solidFill>
+                <a:schemeClr val="bg1"/>
+              </a:solidFill>
+            </a:rPr>
+            <a:t> </a:t>
+          </a:r>
+          <a:r>
+            <a:rPr lang="en-US" dirty="0" err="1">
+              <a:solidFill>
+                <a:schemeClr val="bg1"/>
+              </a:solidFill>
+            </a:rPr>
+            <a:t>d’approfondir</a:t>
+          </a:r>
+          <a:r>
+            <a:rPr lang="en-US" dirty="0">
+              <a:solidFill>
+                <a:schemeClr val="bg1"/>
+              </a:solidFill>
+            </a:rPr>
+            <a:t> </a:t>
+          </a:r>
+          <a:r>
+            <a:rPr lang="en-US" dirty="0" err="1">
+              <a:solidFill>
+                <a:schemeClr val="bg1"/>
+              </a:solidFill>
+            </a:rPr>
+            <a:t>mes</a:t>
+          </a:r>
+          <a:r>
+            <a:rPr lang="en-US" dirty="0">
+              <a:solidFill>
+                <a:schemeClr val="bg1"/>
+              </a:solidFill>
+            </a:rPr>
+            <a:t> </a:t>
+          </a:r>
+          <a:r>
+            <a:rPr lang="en-US" dirty="0" err="1">
+              <a:solidFill>
+                <a:schemeClr val="bg1"/>
+              </a:solidFill>
+            </a:rPr>
+            <a:t>connaissances</a:t>
+          </a:r>
+          <a:r>
+            <a:rPr lang="en-US" dirty="0">
+              <a:solidFill>
+                <a:schemeClr val="bg1"/>
+              </a:solidFill>
+            </a:rPr>
+            <a:t> des technologies du web, </a:t>
+          </a:r>
+          <a:r>
+            <a:rPr lang="en-US" dirty="0" err="1">
+              <a:solidFill>
+                <a:schemeClr val="bg1"/>
+              </a:solidFill>
+            </a:rPr>
+            <a:t>tels</a:t>
+          </a:r>
+          <a:r>
+            <a:rPr lang="en-US" dirty="0">
+              <a:solidFill>
+                <a:schemeClr val="bg1"/>
+              </a:solidFill>
+            </a:rPr>
+            <a:t> que les frameworks, avec Bootstrap, la </a:t>
+          </a:r>
+          <a:r>
+            <a:rPr lang="en-US" dirty="0" err="1">
+              <a:solidFill>
+                <a:schemeClr val="bg1"/>
+              </a:solidFill>
+            </a:rPr>
+            <a:t>gestion</a:t>
+          </a:r>
+          <a:r>
+            <a:rPr lang="en-US" dirty="0">
+              <a:solidFill>
+                <a:schemeClr val="bg1"/>
+              </a:solidFill>
+            </a:rPr>
+            <a:t> </a:t>
+          </a:r>
+          <a:r>
+            <a:rPr lang="en-US" dirty="0" err="1">
+              <a:solidFill>
+                <a:schemeClr val="bg1"/>
+              </a:solidFill>
+            </a:rPr>
+            <a:t>utilisateurs</a:t>
+          </a:r>
+          <a:r>
+            <a:rPr lang="en-US" dirty="0">
+              <a:solidFill>
+                <a:schemeClr val="bg1"/>
+              </a:solidFill>
+            </a:rPr>
+            <a:t>, la </a:t>
+          </a:r>
+          <a:r>
+            <a:rPr lang="en-US" dirty="0" err="1">
+              <a:solidFill>
+                <a:schemeClr val="bg1"/>
+              </a:solidFill>
+            </a:rPr>
+            <a:t>sécurisation</a:t>
+          </a:r>
+          <a:r>
+            <a:rPr lang="en-US" dirty="0">
+              <a:solidFill>
+                <a:schemeClr val="bg1"/>
+              </a:solidFill>
+            </a:rPr>
+            <a:t> de la </a:t>
+          </a:r>
+          <a:r>
+            <a:rPr lang="en-US" dirty="0" err="1">
+              <a:solidFill>
+                <a:schemeClr val="bg1"/>
+              </a:solidFill>
+            </a:rPr>
+            <a:t>connexion</a:t>
+          </a:r>
+          <a:r>
+            <a:rPr lang="en-US" dirty="0">
+              <a:solidFill>
+                <a:schemeClr val="bg1"/>
+              </a:solidFill>
+            </a:rPr>
+            <a:t> avec le </a:t>
+          </a:r>
+          <a:r>
+            <a:rPr lang="en-US" dirty="0" err="1">
+              <a:solidFill>
+                <a:schemeClr val="bg1"/>
+              </a:solidFill>
+            </a:rPr>
+            <a:t>hashage</a:t>
+          </a:r>
+          <a:r>
+            <a:rPr lang="en-US" dirty="0">
+              <a:solidFill>
+                <a:schemeClr val="bg1"/>
+              </a:solidFill>
+            </a:rPr>
+            <a:t> de mot de </a:t>
+          </a:r>
+          <a:r>
+            <a:rPr lang="en-US" dirty="0" err="1">
+              <a:solidFill>
+                <a:schemeClr val="bg1"/>
+              </a:solidFill>
+            </a:rPr>
+            <a:t>passe</a:t>
+          </a:r>
+          <a:r>
+            <a:rPr lang="en-US" dirty="0">
+              <a:solidFill>
+                <a:schemeClr val="bg1"/>
+              </a:solidFill>
+            </a:rPr>
+            <a:t>.</a:t>
+          </a:r>
+          <a:endParaRPr lang="fr-FR" dirty="0">
             <a:solidFill>
               <a:schemeClr val="bg1"/>
             </a:solidFill>
@@ -1069,18 +1286,61 @@
         <a:lstStyle/>
         <a:p>
           <a:r>
-            <a:rPr lang="en-US">
+            <a:rPr lang="fr-FR" dirty="0">
               <a:solidFill>
                 <a:schemeClr val="bg1"/>
               </a:solidFill>
             </a:rPr>
-            <a:t>Lorem ipsum</a:t>
+            <a:t>J'ai majoritairement travaillé sur la partie </a:t>
           </a:r>
-          <a:endParaRPr lang="fr-FR">
-            <a:solidFill>
-              <a:schemeClr val="bg1"/>
-            </a:solidFill>
-          </a:endParaRPr>
+          <a:r>
+            <a:rPr lang="fr-FR" dirty="0" err="1">
+              <a:solidFill>
+                <a:schemeClr val="bg1"/>
+              </a:solidFill>
+            </a:rPr>
+            <a:t>back-end</a:t>
+          </a:r>
+          <a:r>
+            <a:rPr lang="fr-FR" dirty="0">
+              <a:solidFill>
+                <a:schemeClr val="bg1"/>
+              </a:solidFill>
+            </a:rPr>
+            <a:t> de notre réseau social. J'ai pu énormément développer mes compétences en HTML, PHP, SQL ainsi que faire mes premiers pas avec le </a:t>
+          </a:r>
+          <a:r>
+            <a:rPr lang="fr-FR" dirty="0" err="1">
+              <a:solidFill>
+                <a:schemeClr val="bg1"/>
+              </a:solidFill>
+            </a:rPr>
+            <a:t>framework</a:t>
+          </a:r>
+          <a:r>
+            <a:rPr lang="fr-FR" dirty="0">
+              <a:solidFill>
+                <a:schemeClr val="bg1"/>
+              </a:solidFill>
+            </a:rPr>
+            <a:t> </a:t>
+          </a:r>
+          <a:r>
+            <a:rPr lang="fr-FR" dirty="0" err="1">
+              <a:solidFill>
+                <a:schemeClr val="bg1"/>
+              </a:solidFill>
+            </a:rPr>
+            <a:t>Bootsrap</a:t>
+          </a:r>
+          <a:r>
+            <a:rPr lang="fr-FR" dirty="0">
+              <a:solidFill>
+                <a:schemeClr val="bg1"/>
+              </a:solidFill>
+            </a:rPr>
+            <a:t>. </a:t>
+          </a:r>
         </a:p>
       </dgm:t>
     </dgm:pt>
@@ -1196,6 +1456,46 @@
         </a:p>
       </dgm:t>
     </dgm:pt>
+    <dgm:pt modelId="{6F990432-C56C-4CE9-8141-E6995DD92048}">
+      <dgm:prSet/>
+      <dgm:spPr/>
+      <dgm:t>
+        <a:bodyPr/>
+        <a:lstStyle/>
+        <a:p>
+          <a:r>
+            <a:rPr lang="fr-FR" dirty="0">
+              <a:solidFill>
+                <a:schemeClr val="bg1"/>
+              </a:solidFill>
+            </a:rPr>
+            <a:t>J'ai beaucoup apprécié travailler avec Arthur et Maxime qui sont de solides partenaires de travail.</a:t>
+          </a:r>
+        </a:p>
+      </dgm:t>
+    </dgm:pt>
+    <dgm:pt modelId="{93C49408-4527-4996-8536-E6DF4D8BD81F}" type="parTrans" cxnId="{A88D5CE3-D388-4EC0-AB74-DC2D8C3396E6}">
+      <dgm:prSet/>
+      <dgm:spPr/>
+      <dgm:t>
+        <a:bodyPr/>
+        <a:lstStyle/>
+        <a:p>
+          <a:endParaRPr lang="fr-FR"/>
+        </a:p>
+      </dgm:t>
+    </dgm:pt>
+    <dgm:pt modelId="{B34DA55D-03FF-44A6-B85F-81E1D162FD11}" type="sibTrans" cxnId="{A88D5CE3-D388-4EC0-AB74-DC2D8C3396E6}">
+      <dgm:prSet/>
+      <dgm:spPr/>
+      <dgm:t>
+        <a:bodyPr/>
+        <a:lstStyle/>
+        <a:p>
+          <a:endParaRPr lang="fr-FR"/>
+        </a:p>
+      </dgm:t>
+    </dgm:pt>
     <dgm:pt modelId="{636F2F28-F350-4B9F-8FE1-D8ADF14E5F83}" type="pres">
       <dgm:prSet presAssocID="{3F0E9570-C56C-4FED-B7B7-060B314D47D0}" presName="linear" presStyleCnt="0">
         <dgm:presLayoutVars>
@@ -1266,11 +1566,13 @@
     <dgm:cxn modelId="{E7A68C36-4EB1-47F0-B21D-7B527A250F31}" srcId="{43B64DA0-5154-495D-AB88-A59499FE4472}" destId="{34194A96-3139-423E-8B4A-B4A83F26393C}" srcOrd="0" destOrd="0" parTransId="{7C51229B-39AC-4360-B007-7D3D0AFA1351}" sibTransId="{19DBFB1F-EB8F-49C2-BE57-4035981F7E0A}"/>
     <dgm:cxn modelId="{1405BD61-F0F6-4627-B187-ED9E9227E9A5}" type="presOf" srcId="{48474343-AA6A-4707-9FD6-6F9C59DFE67A}" destId="{DBF741F9-1DC0-4037-AD53-15502E619BFB}" srcOrd="0" destOrd="0" presId="urn:microsoft.com/office/officeart/2005/8/layout/vList2"/>
     <dgm:cxn modelId="{44093150-EDF9-4A36-9F9C-EE46D91E2D43}" srcId="{3F0E9570-C56C-4FED-B7B7-060B314D47D0}" destId="{43B64DA0-5154-495D-AB88-A59499FE4472}" srcOrd="1" destOrd="0" parTransId="{314565CD-54BD-4F7E-915D-9B03560616E5}" sibTransId="{F64FE85B-E7B3-4F6A-B5F0-0A2471DFE100}"/>
+    <dgm:cxn modelId="{69793A71-292A-462A-9C9A-1F5D95BFC170}" type="presOf" srcId="{6F990432-C56C-4CE9-8141-E6995DD92048}" destId="{3F0D1A4E-8AAF-49E6-ABCC-78E66116B2AA}" srcOrd="0" destOrd="1" presId="urn:microsoft.com/office/officeart/2005/8/layout/vList2"/>
     <dgm:cxn modelId="{62A6AB81-49C7-4517-B78A-7D5C54C145EF}" type="presOf" srcId="{3F0E9570-C56C-4FED-B7B7-060B314D47D0}" destId="{636F2F28-F350-4B9F-8FE1-D8ADF14E5F83}" srcOrd="0" destOrd="0" presId="urn:microsoft.com/office/officeart/2005/8/layout/vList2"/>
     <dgm:cxn modelId="{D1964FC5-16DC-4A53-BB96-16EDBA5FB81F}" type="presOf" srcId="{8E12B0D3-9FE5-4AF6-BB32-228CA958B35A}" destId="{486979B4-88DC-46B9-84F9-208B287E0E65}" srcOrd="0" destOrd="0" presId="urn:microsoft.com/office/officeart/2005/8/layout/vList2"/>
     <dgm:cxn modelId="{561B6FCA-F53E-4802-8C7E-AE8E97BC469D}" type="presOf" srcId="{43B64DA0-5154-495D-AB88-A59499FE4472}" destId="{2223DA49-5D19-4C7B-9E07-5A07CCA0A96C}" srcOrd="0" destOrd="0" presId="urn:microsoft.com/office/officeart/2005/8/layout/vList2"/>
     <dgm:cxn modelId="{0DC5CCCC-9092-4C67-9794-A4443533DA7C}" srcId="{D3F6803C-A84C-41BC-A312-F3617EFD052B}" destId="{69A1341D-75CD-481E-AF5B-08B5ED138FF0}" srcOrd="0" destOrd="0" parTransId="{054471C0-09BF-4D25-A417-06A90B1931D1}" sibTransId="{924D38E1-FDDB-4ED1-8A0E-BF0939E5BB78}"/>
     <dgm:cxn modelId="{AAAB87D4-2C57-4314-9C1B-443B88B2FAF6}" type="presOf" srcId="{34194A96-3139-423E-8B4A-B4A83F26393C}" destId="{3F0D1A4E-8AAF-49E6-ABCC-78E66116B2AA}" srcOrd="0" destOrd="0" presId="urn:microsoft.com/office/officeart/2005/8/layout/vList2"/>
+    <dgm:cxn modelId="{A88D5CE3-D388-4EC0-AB74-DC2D8C3396E6}" srcId="{43B64DA0-5154-495D-AB88-A59499FE4472}" destId="{6F990432-C56C-4CE9-8141-E6995DD92048}" srcOrd="1" destOrd="0" parTransId="{93C49408-4527-4996-8536-E6DF4D8BD81F}" sibTransId="{B34DA55D-03FF-44A6-B85F-81E1D162FD11}"/>
     <dgm:cxn modelId="{BCBE72EC-AD22-4638-9304-97912F65B65B}" srcId="{48474343-AA6A-4707-9FD6-6F9C59DFE67A}" destId="{1D4FD66E-C3DE-4326-92CB-18850777BB18}" srcOrd="1" destOrd="0" parTransId="{3AC63CB5-F504-44EC-80BE-80FEF7AF5C55}" sibTransId="{DCB39637-D5F9-4A23-BA1A-8DE2D4D5D473}"/>
     <dgm:cxn modelId="{B58384F7-62B1-4F1F-BA9B-BB458F2820BA}" type="presOf" srcId="{69A1341D-75CD-481E-AF5B-08B5ED138FF0}" destId="{CF94A789-4817-454D-8054-99225DA9B880}" srcOrd="0" destOrd="0" presId="urn:microsoft.com/office/officeart/2005/8/layout/vList2"/>
     <dgm:cxn modelId="{04DCC116-34DC-4DE3-AF2C-82F0AC0DD384}" type="presParOf" srcId="{636F2F28-F350-4B9F-8FE1-D8ADF14E5F83}" destId="{DBF741F9-1DC0-4037-AD53-15502E619BFB}" srcOrd="0" destOrd="0" presId="urn:microsoft.com/office/officeart/2005/8/layout/vList2"/>
@@ -1305,8 +1607,8 @@
       </dsp:nvSpPr>
       <dsp:spPr>
         <a:xfrm>
-          <a:off x="0" y="26375"/>
-          <a:ext cx="10515600" cy="663389"/>
+          <a:off x="0" y="55534"/>
+          <a:ext cx="10515600" cy="575639"/>
         </a:xfrm>
         <a:prstGeom prst="roundRect">
           <a:avLst/>
@@ -1369,12 +1671,12 @@
         </a:fontRef>
       </dsp:style>
       <dsp:txBody>
-        <a:bodyPr spcFirstLastPara="0" vert="horz" wrap="square" lIns="102870" tIns="102870" rIns="102870" bIns="102870" numCol="1" spcCol="1270" anchor="ctr" anchorCtr="0">
+        <a:bodyPr spcFirstLastPara="0" vert="horz" wrap="square" lIns="91440" tIns="91440" rIns="91440" bIns="91440" numCol="1" spcCol="1270" anchor="ctr" anchorCtr="0">
           <a:noAutofit/>
         </a:bodyPr>
         <a:lstStyle/>
         <a:p>
-          <a:pPr marL="0" lvl="0" indent="0" algn="l" defTabSz="1200150">
+          <a:pPr marL="0" lvl="0" indent="0" algn="l" defTabSz="1066800">
             <a:lnSpc>
               <a:spcPct val="90000"/>
             </a:lnSpc>
@@ -1387,14 +1689,14 @@
             <a:buNone/>
           </a:pPr>
           <a:r>
-            <a:rPr lang="en-US" sz="2700" kern="1200">
+            <a:rPr lang="en-US" sz="2400" kern="1200">
               <a:solidFill>
                 <a:schemeClr val="bg1"/>
               </a:solidFill>
             </a:rPr>
             <a:t>Maxime</a:t>
           </a:r>
-          <a:endParaRPr lang="fr-FR" sz="2700" kern="1200">
+          <a:endParaRPr lang="fr-FR" sz="2400" kern="1200">
             <a:solidFill>
               <a:schemeClr val="bg1"/>
             </a:solidFill>
@@ -1402,8 +1704,8 @@
         </a:p>
       </dsp:txBody>
       <dsp:txXfrm>
-        <a:off x="32384" y="58759"/>
-        <a:ext cx="10450832" cy="598621"/>
+        <a:off x="28100" y="83634"/>
+        <a:ext cx="10459400" cy="519439"/>
       </dsp:txXfrm>
     </dsp:sp>
     <dsp:sp modelId="{486979B4-88DC-46B9-84F9-208B287E0E65}">
@@ -1413,8 +1715,8 @@
       </dsp:nvSpPr>
       <dsp:spPr>
         <a:xfrm>
-          <a:off x="0" y="689765"/>
-          <a:ext cx="10515600" cy="1956150"/>
+          <a:off x="0" y="631174"/>
+          <a:ext cx="10515600" cy="1465560"/>
         </a:xfrm>
         <a:prstGeom prst="rect">
           <a:avLst/>
@@ -1438,12 +1740,12 @@
         <a:fontRef idx="minor"/>
       </dsp:style>
       <dsp:txBody>
-        <a:bodyPr spcFirstLastPara="0" vert="horz" wrap="square" lIns="333870" tIns="34290" rIns="192024" bIns="34290" numCol="1" spcCol="1270" anchor="t" anchorCtr="0">
+        <a:bodyPr spcFirstLastPara="0" vert="horz" wrap="square" lIns="333870" tIns="30480" rIns="170688" bIns="30480" numCol="1" spcCol="1270" anchor="t" anchorCtr="0">
           <a:noAutofit/>
         </a:bodyPr>
         <a:lstStyle/>
         <a:p>
-          <a:pPr marL="228600" lvl="1" indent="-228600" algn="l" defTabSz="933450">
+          <a:pPr marL="171450" lvl="1" indent="-171450" algn="l" defTabSz="844550">
             <a:lnSpc>
               <a:spcPct val="90000"/>
             </a:lnSpc>
@@ -1456,21 +1758,229 @@
             <a:buChar char="•"/>
           </a:pPr>
           <a:r>
-            <a:rPr lang="en-US" sz="2100" kern="1200">
+            <a:rPr lang="en-US" sz="1900" kern="1200" dirty="0">
               <a:solidFill>
                 <a:schemeClr val="bg1"/>
               </a:solidFill>
             </a:rPr>
-            <a:t>Ce projet de web m’a permis d’approfondir mes connaissances des technologies du web, tels que les frameworks, avec Bootstrap, la gestion utilisateurs, la sécurisation de la connexion avec le hashage de mot de passe.</a:t>
+            <a:t>Ce </a:t>
           </a:r>
-          <a:endParaRPr lang="fr-FR" sz="2100" kern="1200">
+          <a:r>
+            <a:rPr lang="en-US" sz="1900" kern="1200" dirty="0" err="1">
+              <a:solidFill>
+                <a:schemeClr val="bg1"/>
+              </a:solidFill>
+            </a:rPr>
+            <a:t>projet</a:t>
+          </a:r>
+          <a:r>
+            <a:rPr lang="en-US" sz="1900" kern="1200" dirty="0">
+              <a:solidFill>
+                <a:schemeClr val="bg1"/>
+              </a:solidFill>
+            </a:rPr>
+            <a:t> de web </a:t>
+          </a:r>
+          <a:r>
+            <a:rPr lang="en-US" sz="1900" kern="1200" dirty="0" err="1">
+              <a:solidFill>
+                <a:schemeClr val="bg1"/>
+              </a:solidFill>
+            </a:rPr>
+            <a:t>m’a</a:t>
+          </a:r>
+          <a:r>
+            <a:rPr lang="en-US" sz="1900" kern="1200" dirty="0">
+              <a:solidFill>
+                <a:schemeClr val="bg1"/>
+              </a:solidFill>
+            </a:rPr>
+            <a:t> </a:t>
+          </a:r>
+          <a:r>
+            <a:rPr lang="en-US" sz="1900" kern="1200" dirty="0" err="1">
+              <a:solidFill>
+                <a:schemeClr val="bg1"/>
+              </a:solidFill>
+            </a:rPr>
+            <a:t>permis</a:t>
+          </a:r>
+          <a:r>
+            <a:rPr lang="en-US" sz="1900" kern="1200" dirty="0">
+              <a:solidFill>
+                <a:schemeClr val="bg1"/>
+              </a:solidFill>
+            </a:rPr>
+            <a:t> </a:t>
+          </a:r>
+          <a:r>
+            <a:rPr lang="en-US" sz="1900" kern="1200" dirty="0" err="1">
+              <a:solidFill>
+                <a:schemeClr val="bg1"/>
+              </a:solidFill>
+            </a:rPr>
+            <a:t>d’approfondir</a:t>
+          </a:r>
+          <a:r>
+            <a:rPr lang="en-US" sz="1900" kern="1200" dirty="0">
+              <a:solidFill>
+                <a:schemeClr val="bg1"/>
+              </a:solidFill>
+            </a:rPr>
+            <a:t> </a:t>
+          </a:r>
+          <a:r>
+            <a:rPr lang="en-US" sz="1900" kern="1200" dirty="0" err="1">
+              <a:solidFill>
+                <a:schemeClr val="bg1"/>
+              </a:solidFill>
+            </a:rPr>
+            <a:t>mes</a:t>
+          </a:r>
+          <a:r>
+            <a:rPr lang="en-US" sz="1900" kern="1200" dirty="0">
+              <a:solidFill>
+                <a:schemeClr val="bg1"/>
+              </a:solidFill>
+            </a:rPr>
+            <a:t> </a:t>
+          </a:r>
+          <a:r>
+            <a:rPr lang="en-US" sz="1900" kern="1200" dirty="0" err="1">
+              <a:solidFill>
+                <a:schemeClr val="bg1"/>
+              </a:solidFill>
+            </a:rPr>
+            <a:t>connaissances</a:t>
+          </a:r>
+          <a:r>
+            <a:rPr lang="en-US" sz="1900" kern="1200" dirty="0">
+              <a:solidFill>
+                <a:schemeClr val="bg1"/>
+              </a:solidFill>
+            </a:rPr>
+            <a:t> des technologies du web, </a:t>
+          </a:r>
+          <a:r>
+            <a:rPr lang="en-US" sz="1900" kern="1200" dirty="0" err="1">
+              <a:solidFill>
+                <a:schemeClr val="bg1"/>
+              </a:solidFill>
+            </a:rPr>
+            <a:t>tels</a:t>
+          </a:r>
+          <a:r>
+            <a:rPr lang="en-US" sz="1900" kern="1200" dirty="0">
+              <a:solidFill>
+                <a:schemeClr val="bg1"/>
+              </a:solidFill>
+            </a:rPr>
+            <a:t> que les frameworks, avec Bootstrap, la </a:t>
+          </a:r>
+          <a:r>
+            <a:rPr lang="en-US" sz="1900" kern="1200" dirty="0" err="1">
+              <a:solidFill>
+                <a:schemeClr val="bg1"/>
+              </a:solidFill>
+            </a:rPr>
+            <a:t>gestion</a:t>
+          </a:r>
+          <a:r>
+            <a:rPr lang="en-US" sz="1900" kern="1200" dirty="0">
+              <a:solidFill>
+                <a:schemeClr val="bg1"/>
+              </a:solidFill>
+            </a:rPr>
+            <a:t> </a:t>
+          </a:r>
+          <a:r>
+            <a:rPr lang="en-US" sz="1900" kern="1200" dirty="0" err="1">
+              <a:solidFill>
+                <a:schemeClr val="bg1"/>
+              </a:solidFill>
+            </a:rPr>
+            <a:t>utilisateurs</a:t>
+          </a:r>
+          <a:r>
+            <a:rPr lang="en-US" sz="1900" kern="1200" dirty="0">
+              <a:solidFill>
+                <a:schemeClr val="bg1"/>
+              </a:solidFill>
+            </a:rPr>
+            <a:t>, la </a:t>
+          </a:r>
+          <a:r>
+            <a:rPr lang="en-US" sz="1900" kern="1200" dirty="0" err="1">
+              <a:solidFill>
+                <a:schemeClr val="bg1"/>
+              </a:solidFill>
+            </a:rPr>
+            <a:t>sécurisation</a:t>
+          </a:r>
+          <a:r>
+            <a:rPr lang="en-US" sz="1900" kern="1200" dirty="0">
+              <a:solidFill>
+                <a:schemeClr val="bg1"/>
+              </a:solidFill>
+            </a:rPr>
+            <a:t> de la </a:t>
+          </a:r>
+          <a:r>
+            <a:rPr lang="en-US" sz="1900" kern="1200" dirty="0" err="1">
+              <a:solidFill>
+                <a:schemeClr val="bg1"/>
+              </a:solidFill>
+            </a:rPr>
+            <a:t>connexion</a:t>
+          </a:r>
+          <a:r>
+            <a:rPr lang="en-US" sz="1900" kern="1200" dirty="0">
+              <a:solidFill>
+                <a:schemeClr val="bg1"/>
+              </a:solidFill>
+            </a:rPr>
+            <a:t> avec le </a:t>
+          </a:r>
+          <a:r>
+            <a:rPr lang="en-US" sz="1900" kern="1200" dirty="0" err="1">
+              <a:solidFill>
+                <a:schemeClr val="bg1"/>
+              </a:solidFill>
+            </a:rPr>
+            <a:t>hashage</a:t>
+          </a:r>
+          <a:r>
+            <a:rPr lang="en-US" sz="1900" kern="1200" dirty="0">
+              <a:solidFill>
+                <a:schemeClr val="bg1"/>
+              </a:solidFill>
+            </a:rPr>
+            <a:t> de mot de </a:t>
+          </a:r>
+          <a:r>
+            <a:rPr lang="en-US" sz="1900" kern="1200" dirty="0" err="1">
+              <a:solidFill>
+                <a:schemeClr val="bg1"/>
+              </a:solidFill>
+            </a:rPr>
+            <a:t>passe</a:t>
+          </a:r>
+          <a:r>
+            <a:rPr lang="en-US" sz="1900" kern="1200" dirty="0">
+              <a:solidFill>
+                <a:schemeClr val="bg1"/>
+              </a:solidFill>
+            </a:rPr>
+            <a:t>.</a:t>
+          </a:r>
+          <a:endParaRPr lang="fr-FR" sz="1900" kern="1200" dirty="0">
             <a:solidFill>
               <a:schemeClr val="bg1"/>
             </a:solidFill>
           </a:endParaRPr>
         </a:p>
         <a:p>
-          <a:pPr marL="228600" lvl="1" indent="-228600" algn="l" defTabSz="933450">
+          <a:pPr marL="171450" lvl="1" indent="-171450" algn="l" defTabSz="844550">
             <a:lnSpc>
               <a:spcPct val="90000"/>
             </a:lnSpc>
@@ -1483,14 +1993,14 @@
             <a:buChar char="•"/>
           </a:pPr>
           <a:r>
-            <a:rPr lang="en-US" sz="2100" kern="1200">
+            <a:rPr lang="en-US" sz="1900" kern="1200">
               <a:solidFill>
                 <a:schemeClr val="bg1"/>
               </a:solidFill>
             </a:rPr>
             <a:t>J’ai aussi pu appliquer mes connaissances en design UI pour réaliser le front-end. J’ai néanmoins été limité par le temps alloué et par la complexité de Bootstrap, pour sa première utilisation.</a:t>
           </a:r>
-          <a:endParaRPr lang="fr-FR" sz="2100" kern="1200">
+          <a:endParaRPr lang="fr-FR" sz="1900" kern="1200">
             <a:solidFill>
               <a:schemeClr val="bg1"/>
             </a:solidFill>
@@ -1498,8 +2008,8 @@
         </a:p>
       </dsp:txBody>
       <dsp:txXfrm>
-        <a:off x="0" y="689765"/>
-        <a:ext cx="10515600" cy="1956150"/>
+        <a:off x="0" y="631174"/>
+        <a:ext cx="10515600" cy="1465560"/>
       </dsp:txXfrm>
     </dsp:sp>
     <dsp:sp modelId="{2223DA49-5D19-4C7B-9E07-5A07CCA0A96C}">
@@ -1509,8 +2019,8 @@
       </dsp:nvSpPr>
       <dsp:spPr>
         <a:xfrm>
-          <a:off x="0" y="2645915"/>
-          <a:ext cx="10515600" cy="663389"/>
+          <a:off x="0" y="2096735"/>
+          <a:ext cx="10515600" cy="575639"/>
         </a:xfrm>
         <a:prstGeom prst="roundRect">
           <a:avLst/>
@@ -1573,12 +2083,12 @@
         </a:fontRef>
       </dsp:style>
       <dsp:txBody>
-        <a:bodyPr spcFirstLastPara="0" vert="horz" wrap="square" lIns="102870" tIns="102870" rIns="102870" bIns="102870" numCol="1" spcCol="1270" anchor="ctr" anchorCtr="0">
+        <a:bodyPr spcFirstLastPara="0" vert="horz" wrap="square" lIns="91440" tIns="91440" rIns="91440" bIns="91440" numCol="1" spcCol="1270" anchor="ctr" anchorCtr="0">
           <a:noAutofit/>
         </a:bodyPr>
         <a:lstStyle/>
         <a:p>
-          <a:pPr marL="0" lvl="0" indent="0" algn="l" defTabSz="1200150">
+          <a:pPr marL="0" lvl="0" indent="0" algn="l" defTabSz="1066800">
             <a:lnSpc>
               <a:spcPct val="90000"/>
             </a:lnSpc>
@@ -1591,14 +2101,14 @@
             <a:buNone/>
           </a:pPr>
           <a:r>
-            <a:rPr lang="en-US" sz="2700" kern="1200">
+            <a:rPr lang="en-US" sz="2400" kern="1200">
               <a:solidFill>
                 <a:schemeClr val="bg1"/>
               </a:solidFill>
             </a:rPr>
             <a:t>Sam</a:t>
           </a:r>
-          <a:endParaRPr lang="fr-FR" sz="2700" kern="1200">
+          <a:endParaRPr lang="fr-FR" sz="2400" kern="1200">
             <a:solidFill>
               <a:schemeClr val="bg1"/>
             </a:solidFill>
@@ -1606,8 +2116,8 @@
         </a:p>
       </dsp:txBody>
       <dsp:txXfrm>
-        <a:off x="32384" y="2678299"/>
-        <a:ext cx="10450832" cy="598621"/>
+        <a:off x="28100" y="2124835"/>
+        <a:ext cx="10459400" cy="519439"/>
       </dsp:txXfrm>
     </dsp:sp>
     <dsp:sp modelId="{3F0D1A4E-8AAF-49E6-ABCC-78E66116B2AA}">
@@ -1617,8 +2127,8 @@
       </dsp:nvSpPr>
       <dsp:spPr>
         <a:xfrm>
-          <a:off x="0" y="3309305"/>
-          <a:ext cx="10515600" cy="447120"/>
+          <a:off x="0" y="2672375"/>
+          <a:ext cx="10515600" cy="1192320"/>
         </a:xfrm>
         <a:prstGeom prst="rect">
           <a:avLst/>
@@ -1642,12 +2152,12 @@
         <a:fontRef idx="minor"/>
       </dsp:style>
       <dsp:txBody>
-        <a:bodyPr spcFirstLastPara="0" vert="horz" wrap="square" lIns="333870" tIns="34290" rIns="192024" bIns="34290" numCol="1" spcCol="1270" anchor="t" anchorCtr="0">
+        <a:bodyPr spcFirstLastPara="0" vert="horz" wrap="square" lIns="333870" tIns="30480" rIns="170688" bIns="30480" numCol="1" spcCol="1270" anchor="t" anchorCtr="0">
           <a:noAutofit/>
         </a:bodyPr>
         <a:lstStyle/>
         <a:p>
-          <a:pPr marL="228600" lvl="1" indent="-228600" algn="l" defTabSz="933450">
+          <a:pPr marL="171450" lvl="1" indent="-171450" algn="l" defTabSz="844550">
             <a:lnSpc>
               <a:spcPct val="90000"/>
             </a:lnSpc>
@@ -1660,23 +2170,88 @@
             <a:buChar char="•"/>
           </a:pPr>
           <a:r>
-            <a:rPr lang="en-US" sz="2100" kern="1200">
+            <a:rPr lang="fr-FR" sz="1900" kern="1200" dirty="0">
               <a:solidFill>
                 <a:schemeClr val="bg1"/>
               </a:solidFill>
             </a:rPr>
-            <a:t>Lorem ipsum</a:t>
+            <a:t>J'ai majoritairement travaillé sur la partie </a:t>
           </a:r>
-          <a:endParaRPr lang="fr-FR" sz="2100" kern="1200">
-            <a:solidFill>
-              <a:schemeClr val="bg1"/>
-            </a:solidFill>
-          </a:endParaRPr>
+          <a:r>
+            <a:rPr lang="fr-FR" sz="1900" kern="1200" dirty="0" err="1">
+              <a:solidFill>
+                <a:schemeClr val="bg1"/>
+              </a:solidFill>
+            </a:rPr>
+            <a:t>back-end</a:t>
+          </a:r>
+          <a:r>
+            <a:rPr lang="fr-FR" sz="1900" kern="1200" dirty="0">
+              <a:solidFill>
+                <a:schemeClr val="bg1"/>
+              </a:solidFill>
+            </a:rPr>
+            <a:t> de notre réseau social. J'ai pu énormément développer mes compétences en HTML, PHP, SQL ainsi que faire mes premiers pas avec le </a:t>
+          </a:r>
+          <a:r>
+            <a:rPr lang="fr-FR" sz="1900" kern="1200" dirty="0" err="1">
+              <a:solidFill>
+                <a:schemeClr val="bg1"/>
+              </a:solidFill>
+            </a:rPr>
+            <a:t>framework</a:t>
+          </a:r>
+          <a:r>
+            <a:rPr lang="fr-FR" sz="1900" kern="1200" dirty="0">
+              <a:solidFill>
+                <a:schemeClr val="bg1"/>
+              </a:solidFill>
+            </a:rPr>
+            <a:t> </a:t>
+          </a:r>
+          <a:r>
+            <a:rPr lang="fr-FR" sz="1900" kern="1200" dirty="0" err="1">
+              <a:solidFill>
+                <a:schemeClr val="bg1"/>
+              </a:solidFill>
+            </a:rPr>
+            <a:t>Bootsrap</a:t>
+          </a:r>
+          <a:r>
+            <a:rPr lang="fr-FR" sz="1900" kern="1200" dirty="0">
+              <a:solidFill>
+                <a:schemeClr val="bg1"/>
+              </a:solidFill>
+            </a:rPr>
+            <a:t>. </a:t>
+          </a:r>
+        </a:p>
+        <a:p>
+          <a:pPr marL="171450" lvl="1" indent="-171450" algn="l" defTabSz="844550">
+            <a:lnSpc>
+              <a:spcPct val="90000"/>
+            </a:lnSpc>
+            <a:spcBef>
+              <a:spcPct val="0"/>
+            </a:spcBef>
+            <a:spcAft>
+              <a:spcPct val="20000"/>
+            </a:spcAft>
+            <a:buChar char="•"/>
+          </a:pPr>
+          <a:r>
+            <a:rPr lang="fr-FR" sz="1900" kern="1200" dirty="0">
+              <a:solidFill>
+                <a:schemeClr val="bg1"/>
+              </a:solidFill>
+            </a:rPr>
+            <a:t>J'ai beaucoup apprécié travailler avec Arthur et Maxime qui sont de solides partenaires de travail.</a:t>
+          </a:r>
         </a:p>
       </dsp:txBody>
       <dsp:txXfrm>
-        <a:off x="0" y="3309305"/>
-        <a:ext cx="10515600" cy="447120"/>
+        <a:off x="0" y="2672375"/>
+        <a:ext cx="10515600" cy="1192320"/>
       </dsp:txXfrm>
     </dsp:sp>
     <dsp:sp modelId="{15E117ED-0CA8-46D8-9612-72E0DD660F54}">
@@ -1686,8 +2261,8 @@
       </dsp:nvSpPr>
       <dsp:spPr>
         <a:xfrm>
-          <a:off x="0" y="3756425"/>
-          <a:ext cx="10515600" cy="663389"/>
+          <a:off x="0" y="3864695"/>
+          <a:ext cx="10515600" cy="575639"/>
         </a:xfrm>
         <a:prstGeom prst="roundRect">
           <a:avLst/>
@@ -1750,12 +2325,12 @@
         </a:fontRef>
       </dsp:style>
       <dsp:txBody>
-        <a:bodyPr spcFirstLastPara="0" vert="horz" wrap="square" lIns="102870" tIns="102870" rIns="102870" bIns="102870" numCol="1" spcCol="1270" anchor="ctr" anchorCtr="0">
+        <a:bodyPr spcFirstLastPara="0" vert="horz" wrap="square" lIns="91440" tIns="91440" rIns="91440" bIns="91440" numCol="1" spcCol="1270" anchor="ctr" anchorCtr="0">
           <a:noAutofit/>
         </a:bodyPr>
         <a:lstStyle/>
         <a:p>
-          <a:pPr marL="0" lvl="0" indent="0" algn="l" defTabSz="1200150">
+          <a:pPr marL="0" lvl="0" indent="0" algn="l" defTabSz="1066800">
             <a:lnSpc>
               <a:spcPct val="90000"/>
             </a:lnSpc>
@@ -1768,14 +2343,14 @@
             <a:buNone/>
           </a:pPr>
           <a:r>
-            <a:rPr lang="en-US" sz="2700" kern="1200">
+            <a:rPr lang="en-US" sz="2400" kern="1200">
               <a:solidFill>
                 <a:schemeClr val="bg1"/>
               </a:solidFill>
             </a:rPr>
             <a:t>Arthur</a:t>
           </a:r>
-          <a:endParaRPr lang="fr-FR" sz="2700" kern="1200">
+          <a:endParaRPr lang="fr-FR" sz="2400" kern="1200">
             <a:solidFill>
               <a:schemeClr val="bg1"/>
             </a:solidFill>
@@ -1783,8 +2358,8 @@
         </a:p>
       </dsp:txBody>
       <dsp:txXfrm>
-        <a:off x="32384" y="3788809"/>
-        <a:ext cx="10450832" cy="598621"/>
+        <a:off x="28100" y="3892795"/>
+        <a:ext cx="10459400" cy="519439"/>
       </dsp:txXfrm>
     </dsp:sp>
     <dsp:sp modelId="{CF94A789-4817-454D-8054-99225DA9B880}">
@@ -1794,8 +2369,8 @@
       </dsp:nvSpPr>
       <dsp:spPr>
         <a:xfrm>
-          <a:off x="0" y="4419815"/>
-          <a:ext cx="10515600" cy="447120"/>
+          <a:off x="0" y="4440335"/>
+          <a:ext cx="10515600" cy="397440"/>
         </a:xfrm>
         <a:prstGeom prst="rect">
           <a:avLst/>
@@ -1819,12 +2394,12 @@
         <a:fontRef idx="minor"/>
       </dsp:style>
       <dsp:txBody>
-        <a:bodyPr spcFirstLastPara="0" vert="horz" wrap="square" lIns="333870" tIns="34290" rIns="192024" bIns="34290" numCol="1" spcCol="1270" anchor="t" anchorCtr="0">
+        <a:bodyPr spcFirstLastPara="0" vert="horz" wrap="square" lIns="333870" tIns="30480" rIns="170688" bIns="30480" numCol="1" spcCol="1270" anchor="t" anchorCtr="0">
           <a:noAutofit/>
         </a:bodyPr>
         <a:lstStyle/>
         <a:p>
-          <a:pPr marL="228600" lvl="1" indent="-228600" algn="l" defTabSz="933450">
+          <a:pPr marL="171450" lvl="1" indent="-171450" algn="l" defTabSz="844550">
             <a:lnSpc>
               <a:spcPct val="90000"/>
             </a:lnSpc>
@@ -1837,14 +2412,14 @@
             <a:buChar char="•"/>
           </a:pPr>
           <a:r>
-            <a:rPr lang="en-US" sz="2100" kern="1200">
+            <a:rPr lang="en-US" sz="1900" kern="1200">
               <a:solidFill>
                 <a:schemeClr val="bg1"/>
               </a:solidFill>
             </a:rPr>
             <a:t>Lorem ipsum</a:t>
           </a:r>
-          <a:endParaRPr lang="fr-FR" sz="2100" kern="1200">
+          <a:endParaRPr lang="fr-FR" sz="1900" kern="1200">
             <a:solidFill>
               <a:schemeClr val="bg1"/>
             </a:solidFill>
@@ -1852,8 +2427,8 @@
         </a:p>
       </dsp:txBody>
       <dsp:txXfrm>
-        <a:off x="0" y="4419815"/>
-        <a:ext cx="10515600" cy="447120"/>
+        <a:off x="0" y="4440335"/>
+        <a:ext cx="10515600" cy="397440"/>
       </dsp:txXfrm>
     </dsp:sp>
   </dsp:spTree>
@@ -3302,7 +3877,7 @@
           <a:p>
             <a:fld id="{3F14AA29-A5C9-4E70-9FC7-1E451EE807D1}" type="slidenum">
               <a:rPr lang="fr-FR" smtClean="0"/>
-              <a:t>‹#›</a:t>
+              <a:t>‹N°›</a:t>
             </a:fld>
             <a:endParaRPr lang="fr-FR"/>
           </a:p>
@@ -3625,7 +4200,7 @@
           <a:p>
             <a:fld id="{28199CC4-E14D-46D2-8892-87DF96C49442}" type="slidenum">
               <a:rPr lang="fr-FR" smtClean="0"/>
-              <a:t>‹#›</a:t>
+              <a:t>‹N°›</a:t>
             </a:fld>
             <a:endParaRPr lang="fr-FR"/>
           </a:p>
@@ -3828,7 +4403,7 @@
           <a:p>
             <a:fld id="{28199CC4-E14D-46D2-8892-87DF96C49442}" type="slidenum">
               <a:rPr lang="fr-FR" smtClean="0"/>
-              <a:t>‹#›</a:t>
+              <a:t>‹N°›</a:t>
             </a:fld>
             <a:endParaRPr lang="fr-FR"/>
           </a:p>
@@ -4041,7 +4616,7 @@
           <a:p>
             <a:fld id="{28199CC4-E14D-46D2-8892-87DF96C49442}" type="slidenum">
               <a:rPr lang="fr-FR" smtClean="0"/>
-              <a:t>‹#›</a:t>
+              <a:t>‹N°›</a:t>
             </a:fld>
             <a:endParaRPr lang="fr-FR"/>
           </a:p>
@@ -4244,7 +4819,7 @@
           <a:p>
             <a:fld id="{28199CC4-E14D-46D2-8892-87DF96C49442}" type="slidenum">
               <a:rPr lang="fr-FR" smtClean="0"/>
-              <a:t>‹#›</a:t>
+              <a:t>‹N°›</a:t>
             </a:fld>
             <a:endParaRPr lang="fr-FR"/>
           </a:p>
@@ -4523,7 +5098,7 @@
           <a:p>
             <a:fld id="{28199CC4-E14D-46D2-8892-87DF96C49442}" type="slidenum">
               <a:rPr lang="fr-FR" smtClean="0"/>
-              <a:t>‹#›</a:t>
+              <a:t>‹N°›</a:t>
             </a:fld>
             <a:endParaRPr lang="fr-FR"/>
           </a:p>
@@ -4794,7 +5369,7 @@
           <a:p>
             <a:fld id="{28199CC4-E14D-46D2-8892-87DF96C49442}" type="slidenum">
               <a:rPr lang="fr-FR" smtClean="0"/>
-              <a:t>‹#›</a:t>
+              <a:t>‹N°›</a:t>
             </a:fld>
             <a:endParaRPr lang="fr-FR"/>
           </a:p>
@@ -5212,7 +5787,7 @@
           <a:p>
             <a:fld id="{28199CC4-E14D-46D2-8892-87DF96C49442}" type="slidenum">
               <a:rPr lang="fr-FR" smtClean="0"/>
-              <a:t>‹#›</a:t>
+              <a:t>‹N°›</a:t>
             </a:fld>
             <a:endParaRPr lang="fr-FR"/>
           </a:p>
@@ -5357,7 +5932,7 @@
           <a:p>
             <a:fld id="{28199CC4-E14D-46D2-8892-87DF96C49442}" type="slidenum">
               <a:rPr lang="fr-FR" smtClean="0"/>
-              <a:t>‹#›</a:t>
+              <a:t>‹N°›</a:t>
             </a:fld>
             <a:endParaRPr lang="fr-FR"/>
           </a:p>
@@ -5473,7 +6048,7 @@
           <a:p>
             <a:fld id="{28199CC4-E14D-46D2-8892-87DF96C49442}" type="slidenum">
               <a:rPr lang="fr-FR" smtClean="0"/>
-              <a:t>‹#›</a:t>
+              <a:t>‹N°›</a:t>
             </a:fld>
             <a:endParaRPr lang="fr-FR"/>
           </a:p>
@@ -5789,7 +6364,7 @@
           <a:p>
             <a:fld id="{28199CC4-E14D-46D2-8892-87DF96C49442}" type="slidenum">
               <a:rPr lang="fr-FR" smtClean="0"/>
-              <a:t>‹#›</a:t>
+              <a:t>‹N°›</a:t>
             </a:fld>
             <a:endParaRPr lang="fr-FR"/>
           </a:p>
@@ -6081,7 +6656,7 @@
           <a:p>
             <a:fld id="{28199CC4-E14D-46D2-8892-87DF96C49442}" type="slidenum">
               <a:rPr lang="fr-FR" smtClean="0"/>
-              <a:t>‹#›</a:t>
+              <a:t>‹N°›</a:t>
             </a:fld>
             <a:endParaRPr lang="fr-FR"/>
           </a:p>
@@ -6384,7 +6959,7 @@
             <a:fld id="{28199CC4-E14D-46D2-8892-87DF96C49442}" type="slidenum">
               <a:rPr lang="fr-FR" smtClean="0"/>
               <a:pPr/>
-              <a:t>‹#›</a:t>
+              <a:t>‹N°›</a:t>
             </a:fld>
             <a:endParaRPr lang="fr-FR"/>
           </a:p>
@@ -6837,10 +7412,18 @@
           <a:lstStyle/>
           <a:p>
             <a:r>
-              <a:rPr lang="en-US"/>
-              <a:t>Bilan collectif</a:t>
-            </a:r>
-            <a:endParaRPr lang="fr-FR"/>
+              <a:rPr lang="en-US" dirty="0" err="1"/>
+              <a:t>Bilan</a:t>
+            </a:r>
+            <a:r>
+              <a:rPr lang="en-US" dirty="0"/>
+              <a:t> </a:t>
+            </a:r>
+            <a:r>
+              <a:rPr lang="en-US" dirty="0" err="1"/>
+              <a:t>collectif</a:t>
+            </a:r>
+            <a:endParaRPr lang="fr-FR" dirty="0"/>
           </a:p>
         </p:txBody>
       </p:sp>
@@ -6862,10 +7445,33 @@
         </p:nvSpPr>
         <p:spPr/>
         <p:txBody>
-          <a:bodyPr/>
+          <a:bodyPr>
+            <a:normAutofit/>
+          </a:bodyPr>
           <a:lstStyle/>
           <a:p>
-            <a:endParaRPr lang="fr-FR"/>
+            <a:pPr marL="0" indent="0">
+              <a:buNone/>
+            </a:pPr>
+            <a:endParaRPr lang="fr-FR" dirty="0"/>
+          </a:p>
+          <a:p>
+            <a:r>
+              <a:rPr lang="fr-FR" dirty="0"/>
+              <a:t>Cette semaine de projet s'est très bien passée pour notre équipe. </a:t>
+            </a:r>
+          </a:p>
+          <a:p>
+            <a:r>
+              <a:rPr lang="fr-FR" dirty="0"/>
+              <a:t>Une bonne répartition des tâches et une équipe rigoureuse nous ont permis de surmonter toutes les difficultés que nous avons pu rencontrer. </a:t>
+            </a:r>
+          </a:p>
+          <a:p>
+            <a:r>
+              <a:rPr lang="fr-FR" dirty="0"/>
+              <a:t>Cependant étant limité dans le temps, nous n'avons pas pu aller aussi loin que ce que nous souhaitions initialement. </a:t>
+            </a:r>
           </a:p>
         </p:txBody>
       </p:sp>
@@ -7305,8 +7911,8 @@
           </a:p>
         </p:txBody>
       </p:sp>
-      <mc:AlternateContent xmlns:mc="http://schemas.openxmlformats.org/markup-compatibility/2006">
-        <mc:Choice xmlns:pslz="http://schemas.microsoft.com/office/powerpoint/2016/slidezoom" Requires="pslz">
+      <mc:AlternateContent xmlns:mc="http://schemas.openxmlformats.org/markup-compatibility/2006" xmlns:pslz="http://schemas.microsoft.com/office/powerpoint/2016/slidezoom">
+        <mc:Choice Requires="pslz">
           <p:graphicFrame>
             <p:nvGraphicFramePr>
               <p:cNvPr id="6" name="Slide Zoom 5">
@@ -7363,7 +7969,7 @@
             </a:graphic>
           </p:graphicFrame>
         </mc:Choice>
-        <mc:Fallback>
+        <mc:Fallback xmlns="">
           <p:pic>
             <p:nvPicPr>
               <p:cNvPr id="6" name="Slide Zoom 5">
@@ -7380,7 +7986,7 @@
               <p:nvPr/>
             </p:nvPicPr>
             <p:blipFill>
-              <a:blip r:embed="rId2"/>
+              <a:blip r:embed="rId4"/>
               <a:stretch>
                 <a:fillRect/>
               </a:stretch>
@@ -7402,8 +8008,8 @@
           </p:pic>
         </mc:Fallback>
       </mc:AlternateContent>
-      <mc:AlternateContent xmlns:mc="http://schemas.openxmlformats.org/markup-compatibility/2006">
-        <mc:Choice xmlns:pslz="http://schemas.microsoft.com/office/powerpoint/2016/slidezoom" Requires="pslz">
+      <mc:AlternateContent xmlns:mc="http://schemas.openxmlformats.org/markup-compatibility/2006" xmlns:pslz="http://schemas.microsoft.com/office/powerpoint/2016/slidezoom">
+        <mc:Choice Requires="pslz">
           <p:graphicFrame>
             <p:nvGraphicFramePr>
               <p:cNvPr id="8" name="Slide Zoom 7">
@@ -7434,7 +8040,7 @@
                   <pslz:sldZmObj sldId="259" cId="699974462">
                     <pslz:zmPr id="{D826CF20-3C46-48F6-8902-7FD040FA99BE}" returnToParent="0" transitionDur="1000">
                       <p166:blipFill xmlns:p166="http://schemas.microsoft.com/office/powerpoint/2016/6/main">
-                        <a:blip r:embed="rId4"/>
+                        <a:blip r:embed="rId5"/>
                         <a:stretch>
                           <a:fillRect/>
                         </a:stretch>
@@ -7460,11 +8066,11 @@
             </a:graphic>
           </p:graphicFrame>
         </mc:Choice>
-        <mc:Fallback>
+        <mc:Fallback xmlns="">
           <p:pic>
             <p:nvPicPr>
               <p:cNvPr id="8" name="Slide Zoom 7">
-                <a:hlinkClick r:id="rId5" action="ppaction://hlinksldjump"/>
+                <a:hlinkClick r:id="rId6" action="ppaction://hlinksldjump"/>
                 <a:extLst>
                   <a:ext uri="{FF2B5EF4-FFF2-40B4-BE49-F238E27FC236}">
                     <a16:creationId xmlns:a16="http://schemas.microsoft.com/office/drawing/2014/main" id="{242FA174-F392-4D0B-B02D-41D6B313259E}"/>
@@ -7477,7 +8083,7 @@
               <p:nvPr/>
             </p:nvPicPr>
             <p:blipFill>
-              <a:blip r:embed="rId4"/>
+              <a:blip r:embed="rId7"/>
               <a:stretch>
                 <a:fillRect/>
               </a:stretch>
@@ -7499,8 +8105,8 @@
           </p:pic>
         </mc:Fallback>
       </mc:AlternateContent>
-      <mc:AlternateContent xmlns:mc="http://schemas.openxmlformats.org/markup-compatibility/2006">
-        <mc:Choice xmlns:pslz="http://schemas.microsoft.com/office/powerpoint/2016/slidezoom" Requires="pslz">
+      <mc:AlternateContent xmlns:mc="http://schemas.openxmlformats.org/markup-compatibility/2006" xmlns:pslz="http://schemas.microsoft.com/office/powerpoint/2016/slidezoom">
+        <mc:Choice Requires="pslz">
           <p:graphicFrame>
             <p:nvGraphicFramePr>
               <p:cNvPr id="10" name="Slide Zoom 9">
@@ -7531,7 +8137,7 @@
                   <pslz:sldZmObj sldId="262" cId="1971844308">
                     <pslz:zmPr id="{9230B04A-FA87-4AB6-9375-34B8F321C79D}" returnToParent="0" transitionDur="1000">
                       <p166:blipFill xmlns:p166="http://schemas.microsoft.com/office/powerpoint/2016/6/main">
-                        <a:blip r:embed="rId6"/>
+                        <a:blip r:embed="rId8"/>
                         <a:stretch>
                           <a:fillRect/>
                         </a:stretch>
@@ -7557,11 +8163,11 @@
             </a:graphic>
           </p:graphicFrame>
         </mc:Choice>
-        <mc:Fallback>
+        <mc:Fallback xmlns="">
           <p:pic>
             <p:nvPicPr>
               <p:cNvPr id="10" name="Slide Zoom 9">
-                <a:hlinkClick r:id="rId7" action="ppaction://hlinksldjump"/>
+                <a:hlinkClick r:id="rId9" action="ppaction://hlinksldjump"/>
                 <a:extLst>
                   <a:ext uri="{FF2B5EF4-FFF2-40B4-BE49-F238E27FC236}">
                     <a16:creationId xmlns:a16="http://schemas.microsoft.com/office/drawing/2014/main" id="{68E98E0C-3CA0-4B64-8736-4E9C7F5F011A}"/>
@@ -7574,7 +8180,7 @@
               <p:nvPr/>
             </p:nvPicPr>
             <p:blipFill>
-              <a:blip r:embed="rId6"/>
+              <a:blip r:embed="rId10"/>
               <a:stretch>
                 <a:fillRect/>
               </a:stretch>
@@ -7596,8 +8202,8 @@
           </p:pic>
         </mc:Fallback>
       </mc:AlternateContent>
-      <mc:AlternateContent xmlns:mc="http://schemas.openxmlformats.org/markup-compatibility/2006">
-        <mc:Choice xmlns:pslz="http://schemas.microsoft.com/office/powerpoint/2016/slidezoom" Requires="pslz">
+      <mc:AlternateContent xmlns:mc="http://schemas.openxmlformats.org/markup-compatibility/2006" xmlns:pslz="http://schemas.microsoft.com/office/powerpoint/2016/slidezoom">
+        <mc:Choice Requires="pslz">
           <p:graphicFrame>
             <p:nvGraphicFramePr>
               <p:cNvPr id="12" name="Slide Zoom 11">
@@ -7628,7 +8234,7 @@
                   <pslz:sldZmObj sldId="264" cId="2757377778">
                     <pslz:zmPr id="{A9F7676F-6D42-49F2-AF05-551590923AB1}" returnToParent="0" transitionDur="1000">
                       <p166:blipFill xmlns:p166="http://schemas.microsoft.com/office/powerpoint/2016/6/main">
-                        <a:blip r:embed="rId8"/>
+                        <a:blip r:embed="rId11"/>
                         <a:stretch>
                           <a:fillRect/>
                         </a:stretch>
@@ -7654,11 +8260,11 @@
             </a:graphic>
           </p:graphicFrame>
         </mc:Choice>
-        <mc:Fallback>
+        <mc:Fallback xmlns="">
           <p:pic>
             <p:nvPicPr>
               <p:cNvPr id="12" name="Slide Zoom 11">
-                <a:hlinkClick r:id="rId9" action="ppaction://hlinksldjump"/>
+                <a:hlinkClick r:id="rId12" action="ppaction://hlinksldjump"/>
                 <a:extLst>
                   <a:ext uri="{FF2B5EF4-FFF2-40B4-BE49-F238E27FC236}">
                     <a16:creationId xmlns:a16="http://schemas.microsoft.com/office/drawing/2014/main" id="{31438D25-BC93-49E5-8AF8-650F96594AF8}"/>
@@ -7671,7 +8277,7 @@
               <p:nvPr/>
             </p:nvPicPr>
             <p:blipFill>
-              <a:blip r:embed="rId8"/>
+              <a:blip r:embed="rId13"/>
               <a:stretch>
                 <a:fillRect/>
               </a:stretch>
@@ -7693,8 +8299,8 @@
           </p:pic>
         </mc:Fallback>
       </mc:AlternateContent>
-      <mc:AlternateContent xmlns:mc="http://schemas.openxmlformats.org/markup-compatibility/2006">
-        <mc:Choice xmlns:pslz="http://schemas.microsoft.com/office/powerpoint/2016/slidezoom" Requires="pslz">
+      <mc:AlternateContent xmlns:mc="http://schemas.openxmlformats.org/markup-compatibility/2006" xmlns:pslz="http://schemas.microsoft.com/office/powerpoint/2016/slidezoom">
+        <mc:Choice Requires="pslz">
           <p:graphicFrame>
             <p:nvGraphicFramePr>
               <p:cNvPr id="14" name="Slide Zoom 13">
@@ -7725,7 +8331,7 @@
                   <pslz:sldZmObj sldId="265" cId="3063974107">
                     <pslz:zmPr id="{D7220BA5-864F-470D-B101-1C8696094117}" returnToParent="0" transitionDur="1000">
                       <p166:blipFill xmlns:p166="http://schemas.microsoft.com/office/powerpoint/2016/6/main">
-                        <a:blip r:embed="rId10"/>
+                        <a:blip r:embed="rId14"/>
                         <a:stretch>
                           <a:fillRect/>
                         </a:stretch>
@@ -7751,11 +8357,11 @@
             </a:graphic>
           </p:graphicFrame>
         </mc:Choice>
-        <mc:Fallback>
+        <mc:Fallback xmlns="">
           <p:pic>
             <p:nvPicPr>
               <p:cNvPr id="14" name="Slide Zoom 13">
-                <a:hlinkClick r:id="rId11" action="ppaction://hlinksldjump"/>
+                <a:hlinkClick r:id="rId15" action="ppaction://hlinksldjump"/>
                 <a:extLst>
                   <a:ext uri="{FF2B5EF4-FFF2-40B4-BE49-F238E27FC236}">
                     <a16:creationId xmlns:a16="http://schemas.microsoft.com/office/drawing/2014/main" id="{C9668999-D1F2-472D-A1EF-875E8443D650}"/>
@@ -7768,7 +8374,7 @@
               <p:nvPr/>
             </p:nvPicPr>
             <p:blipFill>
-              <a:blip r:embed="rId10"/>
+              <a:blip r:embed="rId16"/>
               <a:stretch>
                 <a:fillRect/>
               </a:stretch>
@@ -7790,8 +8396,8 @@
           </p:pic>
         </mc:Fallback>
       </mc:AlternateContent>
-      <mc:AlternateContent xmlns:mc="http://schemas.openxmlformats.org/markup-compatibility/2006">
-        <mc:Choice xmlns:pslz="http://schemas.microsoft.com/office/powerpoint/2016/slidezoom" Requires="pslz">
+      <mc:AlternateContent xmlns:mc="http://schemas.openxmlformats.org/markup-compatibility/2006" xmlns:pslz="http://schemas.microsoft.com/office/powerpoint/2016/slidezoom">
+        <mc:Choice Requires="pslz">
           <p:graphicFrame>
             <p:nvGraphicFramePr>
               <p:cNvPr id="16" name="Slide Zoom 15">
@@ -7822,7 +8428,7 @@
                   <pslz:sldZmObj sldId="266" cId="2375534347">
                     <pslz:zmPr id="{EF9A157B-63A0-4CDC-8CE4-9B1A16324D71}" returnToParent="0" transitionDur="1000">
                       <p166:blipFill xmlns:p166="http://schemas.microsoft.com/office/powerpoint/2016/6/main">
-                        <a:blip r:embed="rId12"/>
+                        <a:blip r:embed="rId17"/>
                         <a:stretch>
                           <a:fillRect/>
                         </a:stretch>
@@ -7848,11 +8454,11 @@
             </a:graphic>
           </p:graphicFrame>
         </mc:Choice>
-        <mc:Fallback>
+        <mc:Fallback xmlns="">
           <p:pic>
             <p:nvPicPr>
               <p:cNvPr id="16" name="Slide Zoom 15">
-                <a:hlinkClick r:id="rId13" action="ppaction://hlinksldjump"/>
+                <a:hlinkClick r:id="rId18" action="ppaction://hlinksldjump"/>
                 <a:extLst>
                   <a:ext uri="{FF2B5EF4-FFF2-40B4-BE49-F238E27FC236}">
                     <a16:creationId xmlns:a16="http://schemas.microsoft.com/office/drawing/2014/main" id="{853C5504-CEFD-4F84-B294-67F874AE819A}"/>
@@ -7865,7 +8471,7 @@
               <p:nvPr/>
             </p:nvPicPr>
             <p:blipFill>
-              <a:blip r:embed="rId12"/>
+              <a:blip r:embed="rId19"/>
               <a:stretch>
                 <a:fillRect/>
               </a:stretch>
@@ -8707,7 +9313,7 @@
             <p:ph idx="1"/>
             <p:extLst>
               <p:ext uri="{D42A27DB-BD31-4B8C-83A1-F6EECF244321}">
-                <p14:modId xmlns:p14="http://schemas.microsoft.com/office/powerpoint/2010/main" val="207056154"/>
+                <p14:modId xmlns:p14="http://schemas.microsoft.com/office/powerpoint/2010/main" val="2405308417"/>
               </p:ext>
             </p:extLst>
           </p:nvPr>

</xml_diff>